<commit_message>
Changed the protocol cover
</commit_message>
<xml_diff>
--- a/vstopsignal/ProtocolCover.pptx
+++ b/vstopsignal/ProtocolCover.pptx
@@ -3121,8 +3121,8 @@
         </p:nvSpPr>
         <p:spPr>
           <a:xfrm>
-            <a:off x="326571" y="5564777"/>
-            <a:ext cx="6283235" cy="2923877"/>
+            <a:off x="365760" y="5564777"/>
+            <a:ext cx="6244046" cy="2554545"/>
           </a:xfrm>
           <a:prstGeom prst="rect">
             <a:avLst/>
@@ -3164,7 +3164,7 @@
             <a:pPr algn="just"/>
             <a:r>
               <a:rPr lang="en-GB" sz="1200" dirty="0"/>
-              <a:t>The primary measure in the SST is the stop-signal reaction time (SSRT), which reflects how quickly a participant can inhibit their prepotent response. The task evaluates the ability to suppress an already initiated action, making it useful for studying impulse control. The SST is commonly used in research on attention, executive function, and disorders such as ADHD, OCD, and substance abuse, where impaired response inhibition may play a role.</a:t>
+              <a:t>The primary measure in the SST is the stop-signal reaction time (SSRT), which reflects how quickly a participant can inhibit their prepotent response. The task evaluates the ability to suppress an already initiated action, making it useful for studying impulse control</a:t>
             </a:r>
             <a:endParaRPr lang="en-US" sz="1200" dirty="0"/>
           </a:p>

</xml_diff>